<commit_message>
generation of Background version
</commit_message>
<xml_diff>
--- a/AI.pptx
+++ b/AI.pptx
@@ -15,7 +15,6 @@
     <p:sldId id="263" r:id="rId14"/>
     <p:sldId id="264" r:id="rId15"/>
     <p:sldId id="265" r:id="rId16"/>
-    <p:sldId id="266" r:id="rId17"/>
   </p:sldIdLst>
   <p:sldSz cx="9144000" cy="6858000" type="screen4x3"/>
   <p:notesSz cx="6858000" cy="9144000"/>
@@ -123,7 +122,7 @@
     <p:bg>
       <p:bgPr>
         <a:solidFill>
-          <a:srgbClr val="36454F"/>
+          <a:srgbClr val="3498DB"/>
         </a:solidFill>
         <a:effectLst/>
       </p:bgPr>
@@ -373,7 +372,7 @@
     <p:bg>
       <p:bgPr>
         <a:solidFill>
-          <a:srgbClr val="36454F"/>
+          <a:srgbClr val="3498DB"/>
         </a:solidFill>
         <a:effectLst/>
       </p:bgPr>
@@ -551,7 +550,7 @@
     <p:bg>
       <p:bgPr>
         <a:solidFill>
-          <a:srgbClr val="36454F"/>
+          <a:srgbClr val="3498DB"/>
         </a:solidFill>
         <a:effectLst/>
       </p:bgPr>
@@ -739,7 +738,7 @@
     <p:bg>
       <p:bgPr>
         <a:solidFill>
-          <a:srgbClr val="36454F"/>
+          <a:srgbClr val="3498DB"/>
         </a:solidFill>
         <a:effectLst/>
       </p:bgPr>
@@ -917,7 +916,7 @@
     <p:bg>
       <p:bgPr>
         <a:solidFill>
-          <a:srgbClr val="36454F"/>
+          <a:srgbClr val="3498DB"/>
         </a:solidFill>
         <a:effectLst/>
       </p:bgPr>
@@ -1171,7 +1170,7 @@
     <p:bg>
       <p:bgPr>
         <a:solidFill>
-          <a:srgbClr val="36454F"/>
+          <a:srgbClr val="3498DB"/>
         </a:solidFill>
         <a:effectLst/>
       </p:bgPr>
@@ -1467,7 +1466,7 @@
     <p:bg>
       <p:bgPr>
         <a:solidFill>
-          <a:srgbClr val="36454F"/>
+          <a:srgbClr val="3498DB"/>
         </a:solidFill>
         <a:effectLst/>
       </p:bgPr>
@@ -1897,7 +1896,7 @@
     <p:bg>
       <p:bgPr>
         <a:solidFill>
-          <a:srgbClr val="36454F"/>
+          <a:srgbClr val="3498DB"/>
         </a:solidFill>
         <a:effectLst/>
       </p:bgPr>
@@ -2023,7 +2022,7 @@
     <p:bg>
       <p:bgPr>
         <a:solidFill>
-          <a:srgbClr val="36454F"/>
+          <a:srgbClr val="3498DB"/>
         </a:solidFill>
         <a:effectLst/>
       </p:bgPr>
@@ -2126,7 +2125,7 @@
     <p:bg>
       <p:bgPr>
         <a:solidFill>
-          <a:srgbClr val="36454F"/>
+          <a:srgbClr val="3498DB"/>
         </a:solidFill>
         <a:effectLst/>
       </p:bgPr>
@@ -2411,7 +2410,7 @@
     <p:bg>
       <p:bgPr>
         <a:solidFill>
-          <a:srgbClr val="36454F"/>
+          <a:srgbClr val="3498DB"/>
         </a:solidFill>
         <a:effectLst/>
       </p:bgPr>
@@ -3188,56 +3187,125 @@
       <p:grpSpPr/>
       <p:sp>
         <p:nvSpPr>
-          <p:cNvPr id="2" name="Title 1"/>
-          <p:cNvSpPr>
-            <a:spLocks noGrp="1"/>
-          </p:cNvSpPr>
-          <p:nvPr>
-            <p:ph type="ctrTitle"/>
-          </p:nvPr>
-        </p:nvSpPr>
-        <p:spPr/>
-        <p:txBody>
-          <a:bodyPr/>
-          <a:lstStyle/>
-          <a:p>
-            <a:pPr>
-              <a:defRPr b="1" sz="4400">
-                <a:solidFill>
-                  <a:srgbClr val="FFFFFF"/>
+          <p:cNvPr id="2" name="Rectangle 1"/>
+          <p:cNvSpPr/>
+          <p:nvPr/>
+        </p:nvSpPr>
+        <p:spPr>
+          <a:xfrm>
+            <a:off x="4572000" y="0"/>
+            <a:ext cx="4572000" cy="6858000"/>
+          </a:xfrm>
+          <a:prstGeom prst="rect">
+            <a:avLst/>
+          </a:prstGeom>
+          <a:gradFill rotWithShape="1">
+            <a:gsLst>
+              <a:gs pos="0">
+                <a:srgbClr val="FFFFFF"/>
+              </a:gs>
+              <a:gs pos="100000">
+                <a:srgbClr val="3498DB"/>
+              </a:gs>
+            </a:gsLst>
+            <a:lin scaled="0" ang="10800000"/>
+          </a:gradFill>
+          <a:ln>
+            <a:noFill/>
+          </a:ln>
+        </p:spPr>
+        <p:style>
+          <a:lnRef idx="1">
+            <a:schemeClr val="accent1"/>
+          </a:lnRef>
+          <a:fillRef idx="3">
+            <a:schemeClr val="accent1"/>
+          </a:fillRef>
+          <a:effectRef idx="2">
+            <a:schemeClr val="accent1"/>
+          </a:effectRef>
+          <a:fontRef idx="minor">
+            <a:schemeClr val="lt1"/>
+          </a:fontRef>
+        </p:style>
+        <p:txBody>
+          <a:bodyPr rtlCol="0" anchor="ctr"/>
+          <a:lstStyle/>
+          <a:p>
+            <a:pPr algn="ctr"/>
+          </a:p>
+        </p:txBody>
+      </p:sp>
+      <p:pic>
+        <p:nvPicPr>
+          <p:cNvPr id="3" name="Picture 2" descr="Artificial Intelligence Revolution_ViC0envGdTU.jpg"/>
+          <p:cNvPicPr>
+            <a:picLocks noChangeAspect="1"/>
+          </p:cNvPicPr>
+          <p:nvPr/>
+        </p:nvPicPr>
+        <p:blipFill>
+          <a:blip r:embed="rId2"/>
+          <a:stretch>
+            <a:fillRect/>
+          </a:stretch>
+        </p:blipFill>
+        <p:spPr>
+          <a:xfrm>
+            <a:off x="-2857500" y="0"/>
+            <a:ext cx="10287000" cy="6858000"/>
+          </a:xfrm>
+          <a:prstGeom prst="rect">
+            <a:avLst/>
+          </a:prstGeom>
+        </p:spPr>
+      </p:pic>
+      <p:sp>
+        <p:nvSpPr>
+          <p:cNvPr id="4" name="TextBox 3"/>
+          <p:cNvSpPr txBox="1"/>
+          <p:nvPr/>
+        </p:nvSpPr>
+        <p:spPr>
+          <a:xfrm>
+            <a:off x="5029200" y="1371600"/>
+            <a:ext cx="3657600" cy="2743200"/>
+          </a:xfrm>
+          <a:prstGeom prst="rect">
+            <a:avLst/>
+          </a:prstGeom>
+          <a:noFill/>
+        </p:spPr>
+        <p:txBody>
+          <a:bodyPr wrap="square">
+            <a:spAutoFit/>
+          </a:bodyPr>
+          <a:lstStyle/>
+          <a:p>
+            <a:pPr algn="ctr">
+              <a:defRPr sz="4400" b="1">
+                <a:solidFill>
+                  <a:srgbClr val="F1C40F"/>
                 </a:solidFill>
               </a:defRPr>
             </a:pPr>
             <a:r>
-              <a:t>Core Concepts</a:t>
-            </a:r>
-          </a:p>
-        </p:txBody>
-      </p:sp>
-      <p:sp>
-        <p:nvSpPr>
-          <p:cNvPr id="3" name="Subtitle 2"/>
-          <p:cNvSpPr>
-            <a:spLocks noGrp="1"/>
-          </p:cNvSpPr>
-          <p:nvPr>
-            <p:ph type="subTitle" idx="1"/>
-          </p:nvPr>
-        </p:nvSpPr>
-        <p:spPr/>
-        <p:txBody>
-          <a:bodyPr/>
-          <a:lstStyle/>
-          <a:p>
-            <a:pPr>
+              <a:t>Artificial Intelligence Revolution</a:t>
+            </a:r>
+          </a:p>
+          <a:p>
+            <a:pPr algn="ctr">
+              <a:spcBef>
+                <a:spcPts val="2160"/>
+              </a:spcBef>
               <a:defRPr sz="1800">
                 <a:solidFill>
-                  <a:srgbClr val="FFFFFF"/>
+                  <a:srgbClr val="000000"/>
                 </a:solidFill>
               </a:defRPr>
             </a:pPr>
             <a:r>
-              <a:t>Created with AI Presentation Generator</a:t>
+              <a:t>Generated with AI Presentation Generator'Ammar Yasser'</a:t>
             </a:r>
           </a:p>
         </p:txBody>
@@ -3253,14 +3321,6 @@
 <file path=ppt/slides/slide10.xml><?xml version="1.0" encoding="utf-8"?>
 <p:sld xmlns:a="http://schemas.openxmlformats.org/drawingml/2006/main" xmlns:p="http://schemas.openxmlformats.org/presentationml/2006/main" xmlns:r="http://schemas.openxmlformats.org/officeDocument/2006/relationships">
   <p:cSld>
-    <p:bg>
-      <p:bgPr>
-        <a:solidFill>
-          <a:srgbClr val="36454F"/>
-        </a:solidFill>
-        <a:effectLst/>
-      </p:bgPr>
-    </p:bg>
     <p:spTree>
       <p:nvGrpSpPr>
         <p:cNvPr id="1" name=""/>
@@ -3270,118 +3330,6 @@
       <p:grpSpPr/>
       <p:sp>
         <p:nvSpPr>
-          <p:cNvPr id="2" name="TextBox 1"/>
-          <p:cNvSpPr txBox="1"/>
-          <p:nvPr/>
-        </p:nvSpPr>
-        <p:spPr>
-          <a:xfrm>
-            <a:off x="457200" y="457200"/>
-            <a:ext cx="8229600" cy="914400"/>
-          </a:xfrm>
-          <a:prstGeom prst="rect">
-            <a:avLst/>
-          </a:prstGeom>
-          <a:noFill/>
-        </p:spPr>
-        <p:txBody>
-          <a:bodyPr wrap="none">
-            <a:spAutoFit/>
-          </a:bodyPr>
-          <a:lstStyle/>
-          <a:p>
-            <a:pPr algn="ctr">
-              <a:defRPr sz="3200" b="1">
-                <a:solidFill>
-                  <a:srgbClr val="FFFFFF"/>
-                </a:solidFill>
-              </a:defRPr>
-            </a:pPr>
-            <a:r>
-              <a:t>Conclusion</a:t>
-            </a:r>
-          </a:p>
-        </p:txBody>
-      </p:sp>
-      <p:sp>
-        <p:nvSpPr>
-          <p:cNvPr id="3" name="TextBox 2"/>
-          <p:cNvSpPr txBox="1"/>
-          <p:nvPr/>
-        </p:nvSpPr>
-        <p:spPr>
-          <a:xfrm>
-            <a:off x="914400" y="1828800"/>
-            <a:ext cx="7315200" cy="3657600"/>
-          </a:xfrm>
-          <a:prstGeom prst="rect">
-            <a:avLst/>
-          </a:prstGeom>
-          <a:noFill/>
-        </p:spPr>
-        <p:txBody>
-          <a:bodyPr wrap="square" anchor="ctr">
-            <a:spAutoFit/>
-          </a:bodyPr>
-          <a:lstStyle/>
-          <a:p>
-            <a:pPr algn="ctr">
-              <a:defRPr sz="2000">
-                <a:solidFill>
-                  <a:srgbClr val="FFFFFF"/>
-                </a:solidFill>
-              </a:defRPr>
-            </a:pPr>
-            <a:r>
-              <a:t>Summary of key points and takeaways</a:t>
-            </a:r>
-          </a:p>
-          <a:p>
-            <a:pPr algn="ctr">
-              <a:defRPr sz="2000">
-                <a:solidFill>
-                  <a:srgbClr val="FFFFFF"/>
-                </a:solidFill>
-              </a:defRPr>
-            </a:pPr>
-            <a:r>
-              <a:t>Future outlook and recommendations</a:t>
-            </a:r>
-          </a:p>
-          <a:p>
-            <a:pPr algn="ctr">
-              <a:defRPr sz="2000">
-                <a:solidFill>
-                  <a:srgbClr val="FFFFFF"/>
-                </a:solidFill>
-              </a:defRPr>
-            </a:pPr>
-            <a:r>
-              <a:t>Q&amp;A and discussion</a:t>
-            </a:r>
-          </a:p>
-        </p:txBody>
-      </p:sp>
-    </p:spTree>
-  </p:cSld>
-  <p:clrMapOvr>
-    <a:masterClrMapping/>
-  </p:clrMapOvr>
-</p:sld>
-</file>
-
-<file path=ppt/slides/slide11.xml><?xml version="1.0" encoding="utf-8"?>
-<p:sld xmlns:a="http://schemas.openxmlformats.org/drawingml/2006/main" xmlns:p="http://schemas.openxmlformats.org/presentationml/2006/main" xmlns:r="http://schemas.openxmlformats.org/officeDocument/2006/relationships">
-  <p:cSld>
-    <p:spTree>
-      <p:nvGrpSpPr>
-        <p:cNvPr id="1" name=""/>
-        <p:cNvGrpSpPr/>
-        <p:nvPr/>
-      </p:nvGrpSpPr>
-      <p:grpSpPr/>
-      <p:sp>
-        <p:nvSpPr>
           <p:cNvPr id="2" name="Rectangle 1"/>
           <p:cNvSpPr/>
           <p:nvPr/>
@@ -3395,7 +3343,7 @@
             <a:avLst/>
           </a:prstGeom>
           <a:solidFill>
-            <a:srgbClr val="36454F"/>
+            <a:srgbClr val="3498DB"/>
           </a:solidFill>
           <a:ln>
             <a:noFill/>
@@ -3448,7 +3396,7 @@
             <a:pPr algn="ctr">
               <a:defRPr sz="4800" b="1">
                 <a:solidFill>
-                  <a:srgbClr val="FFFFFF"/>
+                  <a:srgbClr val="000000"/>
                 </a:solidFill>
               </a:defRPr>
             </a:pPr>
@@ -3483,7 +3431,7 @@
             <a:pPr algn="ctr">
               <a:defRPr sz="2400">
                 <a:solidFill>
-                  <a:srgbClr val="008000"/>
+                  <a:srgbClr val="F1C40F"/>
                 </a:solidFill>
               </a:defRPr>
             </a:pPr>
@@ -3507,7 +3455,7 @@
     <p:bg>
       <p:bgPr>
         <a:solidFill>
-          <a:srgbClr val="36454F"/>
+          <a:srgbClr val="3498DB"/>
         </a:solidFill>
         <a:effectLst/>
       </p:bgPr>
@@ -3537,7 +3485,7 @@
             <a:pPr>
               <a:defRPr>
                 <a:solidFill>
-                  <a:srgbClr val="FFFFFF"/>
+                  <a:srgbClr val="000000"/>
                 </a:solidFill>
               </a:defRPr>
             </a:pPr>
@@ -3567,12 +3515,12 @@
             <a:pPr>
               <a:defRPr>
                 <a:solidFill>
-                  <a:srgbClr val="FFFFFF"/>
+                  <a:srgbClr val="000000"/>
                 </a:solidFill>
               </a:defRPr>
             </a:pPr>
             <a:r>
-              <a:t>Generative AI refers to a subfield of artificial intelligence that focuses on the creation of new, original content such as images, music, and text. This field has gained significant attention in recent years due to its potential applications in various industries. Generative AI models can learn patterns and relationships from existing data and use this knowledge to generate new, unique content.</a:t>
+              <a:t>Artificial Intelligence (AI) has become a crucial part of our daily lives, transforming the way we live, work, and interact with each other. This presentation aims to explore the concept of AI, its applications, and the future of this technology. We will delve into the world of AI and discover its potential.</a:t>
             </a:r>
           </a:p>
         </p:txBody>
@@ -3591,7 +3539,7 @@
     <p:bg>
       <p:bgPr>
         <a:solidFill>
-          <a:srgbClr val="36454F"/>
+          <a:srgbClr val="3498DB"/>
         </a:solidFill>
         <a:effectLst/>
       </p:bgPr>
@@ -3605,14 +3553,60 @@
       <p:grpSpPr/>
       <p:sp>
         <p:nvSpPr>
-          <p:cNvPr id="2" name="TextBox 1"/>
+          <p:cNvPr id="2" name="Rounded Rectangle 1"/>
+          <p:cNvSpPr/>
+          <p:nvPr/>
+        </p:nvSpPr>
+        <p:spPr>
+          <a:xfrm>
+            <a:off x="4754880" y="1371600"/>
+            <a:ext cx="3931920" cy="4114800"/>
+          </a:xfrm>
+          <a:prstGeom prst="roundRect">
+            <a:avLst/>
+          </a:prstGeom>
+          <a:solidFill>
+            <a:srgbClr val="FFFFFF"/>
+          </a:solidFill>
+          <a:ln w="12700">
+            <a:solidFill>
+              <a:srgbClr val="F1C40F"/>
+            </a:solidFill>
+            <a:prstDash val="dash"/>
+          </a:ln>
+        </p:spPr>
+        <p:style>
+          <a:lnRef idx="1">
+            <a:schemeClr val="accent1"/>
+          </a:lnRef>
+          <a:fillRef idx="3">
+            <a:schemeClr val="accent1"/>
+          </a:fillRef>
+          <a:effectRef idx="2">
+            <a:schemeClr val="accent1"/>
+          </a:effectRef>
+          <a:fontRef idx="minor">
+            <a:schemeClr val="lt1"/>
+          </a:fontRef>
+        </p:style>
+        <p:txBody>
+          <a:bodyPr rtlCol="0" anchor="ctr"/>
+          <a:lstStyle/>
+          <a:p>
+            <a:pPr algn="ctr"/>
+          </a:p>
+        </p:txBody>
+      </p:sp>
+      <p:sp>
+        <p:nvSpPr>
+          <p:cNvPr id="3" name="TextBox 2"/>
           <p:cNvSpPr txBox="1"/>
           <p:nvPr/>
         </p:nvSpPr>
         <p:spPr>
           <a:xfrm>
-            <a:off x="457200" y="457200"/>
-            <a:ext cx="8229600" cy="914400"/>
+            <a:off x="457200" y="274320"/>
+            <a:ext cx="8229600" cy="731520"/>
           </a:xfrm>
           <a:prstGeom prst="rect">
             <a:avLst/>
@@ -3625,105 +3619,110 @@
           </a:bodyPr>
           <a:lstStyle/>
           <a:p>
-            <a:pPr>
-              <a:defRPr sz="3200" b="1">
-                <a:solidFill>
-                  <a:srgbClr val="FFFFFF"/>
+            <a:pPr algn="ctr">
+              <a:defRPr sz="3600" b="1">
+                <a:solidFill>
+                  <a:srgbClr val="000000"/>
                 </a:solidFill>
               </a:defRPr>
             </a:pPr>
             <a:r>
-              <a:t>Core Concepts</a:t>
-            </a:r>
-          </a:p>
-        </p:txBody>
-      </p:sp>
-      <p:sp>
-        <p:nvSpPr>
-          <p:cNvPr id="3" name="TextBox 2"/>
-          <p:cNvSpPr txBox="1"/>
+              <a:t>What is AI?</a:t>
+            </a:r>
+          </a:p>
+        </p:txBody>
+      </p:sp>
+      <p:sp>
+        <p:nvSpPr>
+          <p:cNvPr id="4" name="Rectangle 3"/>
+          <p:cNvSpPr/>
           <p:nvPr/>
         </p:nvSpPr>
         <p:spPr>
           <a:xfrm>
-            <a:off x="457200" y="1371600"/>
-            <a:ext cx="4114800" cy="5029200"/>
+            <a:off x="914400" y="1005840"/>
+            <a:ext cx="7315200" cy="18288"/>
           </a:xfrm>
           <a:prstGeom prst="rect">
             <a:avLst/>
           </a:prstGeom>
-          <a:noFill/>
-        </p:spPr>
-        <p:txBody>
-          <a:bodyPr wrap="square">
-            <a:spAutoFit/>
-          </a:bodyPr>
-          <a:lstStyle/>
-          <a:p>
-            <a:pPr>
-              <a:defRPr sz="1400">
-                <a:solidFill>
-                  <a:srgbClr val="FFFFFF"/>
-                </a:solidFill>
-              </a:defRPr>
-            </a:pPr>
-            <a:r>
-              <a:t>Adversarial Training</a:t>
-            </a:r>
-          </a:p>
-          <a:p>
-            <a:pPr>
-              <a:defRPr sz="1400">
-                <a:solidFill>
-                  <a:srgbClr val="FFFFFF"/>
-                </a:solidFill>
-              </a:defRPr>
-            </a:pPr>
-            <a:r>
-              <a:t>Generative Adversarial Networks (GANs)</a:t>
-            </a:r>
-          </a:p>
-          <a:p>
-            <a:pPr>
-              <a:defRPr sz="1400">
-                <a:solidFill>
-                  <a:srgbClr val="FFFFFF"/>
-                </a:solidFill>
-              </a:defRPr>
-            </a:pPr>
-            <a:r>
-              <a:t>Variational Autoencoders (VAEs)</a:t>
-            </a:r>
-          </a:p>
-          <a:p>
-            <a:pPr>
-              <a:defRPr sz="1400">
-                <a:solidFill>
-                  <a:srgbClr val="FFFFFF"/>
-                </a:solidFill>
-              </a:defRPr>
-            </a:pPr>
-            <a:r>
-              <a:t>Reinforcement Learning</a:t>
-            </a:r>
-          </a:p>
-          <a:p>
-            <a:pPr>
-              <a:defRPr sz="1400">
-                <a:solidFill>
-                  <a:srgbClr val="FFFFFF"/>
-                </a:solidFill>
-              </a:defRPr>
-            </a:pPr>
-            <a:r>
-              <a:t>Data Augmentation</a:t>
-            </a:r>
+          <a:solidFill>
+            <a:srgbClr val="F1C40F"/>
+          </a:solidFill>
+          <a:ln>
+            <a:noFill/>
+          </a:ln>
+        </p:spPr>
+        <p:style>
+          <a:lnRef idx="1">
+            <a:schemeClr val="accent1"/>
+          </a:lnRef>
+          <a:fillRef idx="3">
+            <a:schemeClr val="accent1"/>
+          </a:fillRef>
+          <a:effectRef idx="2">
+            <a:schemeClr val="accent1"/>
+          </a:effectRef>
+          <a:fontRef idx="minor">
+            <a:schemeClr val="lt1"/>
+          </a:fontRef>
+        </p:style>
+        <p:txBody>
+          <a:bodyPr rtlCol="0" anchor="ctr"/>
+          <a:lstStyle/>
+          <a:p>
+            <a:pPr algn="ctr"/>
+          </a:p>
+        </p:txBody>
+      </p:sp>
+      <p:sp>
+        <p:nvSpPr>
+          <p:cNvPr id="5" name="Rounded Rectangle 4"/>
+          <p:cNvSpPr/>
+          <p:nvPr/>
+        </p:nvSpPr>
+        <p:spPr>
+          <a:xfrm>
+            <a:off x="731520" y="1371600"/>
+            <a:ext cx="3657600" cy="4114800"/>
+          </a:xfrm>
+          <a:prstGeom prst="roundRect">
+            <a:avLst/>
+          </a:prstGeom>
+          <a:solidFill>
+            <a:srgbClr val="FFFFFF"/>
+          </a:solidFill>
+          <a:ln w="25400">
+            <a:solidFill>
+              <a:srgbClr val="F1C40F"/>
+            </a:solidFill>
+          </a:ln>
+        </p:spPr>
+        <p:style>
+          <a:lnRef idx="1">
+            <a:schemeClr val="accent1"/>
+          </a:lnRef>
+          <a:fillRef idx="3">
+            <a:schemeClr val="accent1"/>
+          </a:fillRef>
+          <a:effectRef idx="2">
+            <a:schemeClr val="accent1"/>
+          </a:effectRef>
+          <a:fontRef idx="minor">
+            <a:schemeClr val="lt1"/>
+          </a:fontRef>
+        </p:style>
+        <p:txBody>
+          <a:bodyPr rtlCol="0" anchor="ctr"/>
+          <a:lstStyle/>
+          <a:p>
+            <a:pPr algn="ctr"/>
           </a:p>
         </p:txBody>
       </p:sp>
       <p:pic>
         <p:nvPicPr>
-          <p:cNvPr id="4" name="Picture 3" descr="Core Concepts_Mgx1oe2vlVY.jpg"/>
+          <p:cNvPr id="6" name="Picture 5" descr="Artificial Intelligence Revolution_ViC0envGdTU.jpg"/>
           <p:cNvPicPr>
             <a:picLocks noChangeAspect="1"/>
           </p:cNvPicPr>
@@ -3737,14 +3736,198 @@
         </p:blipFill>
         <p:spPr>
           <a:xfrm>
-            <a:off x="5029200" y="1371600"/>
-            <a:ext cx="4114800" cy="5029200"/>
+            <a:off x="731520" y="2209800"/>
+            <a:ext cx="3657600" cy="2438400"/>
           </a:xfrm>
           <a:prstGeom prst="rect">
             <a:avLst/>
           </a:prstGeom>
         </p:spPr>
       </p:pic>
+      <p:sp>
+        <p:nvSpPr>
+          <p:cNvPr id="7" name="TextBox 6"/>
+          <p:cNvSpPr txBox="1"/>
+          <p:nvPr/>
+        </p:nvSpPr>
+        <p:spPr>
+          <a:xfrm>
+            <a:off x="4937760" y="1828800"/>
+            <a:ext cx="3566160" cy="3749040"/>
+          </a:xfrm>
+          <a:prstGeom prst="rect">
+            <a:avLst/>
+          </a:prstGeom>
+          <a:noFill/>
+        </p:spPr>
+        <p:txBody>
+          <a:bodyPr wrap="square">
+            <a:spAutoFit/>
+          </a:bodyPr>
+          <a:lstStyle/>
+          <a:p>
+            <a:pPr>
+              <a:spcAft>
+                <a:spcPts val="1080"/>
+              </a:spcAft>
+              <a:defRPr sz="1600" b="1">
+                <a:solidFill>
+                  <a:srgbClr val="000000"/>
+                </a:solidFill>
+              </a:defRPr>
+            </a:pPr>
+            <a:r>
+              <a:t>●  Machine Learning</a:t>
+            </a:r>
+          </a:p>
+          <a:p>
+            <a:pPr>
+              <a:spcAft>
+                <a:spcPts val="1080"/>
+              </a:spcAft>
+              <a:defRPr sz="1600">
+                <a:solidFill>
+                  <a:srgbClr val="000000"/>
+                </a:solidFill>
+              </a:defRPr>
+            </a:pPr>
+            <a:r>
+              <a:t>●  Deep Learning</a:t>
+            </a:r>
+          </a:p>
+          <a:p>
+            <a:pPr>
+              <a:spcAft>
+                <a:spcPts val="1080"/>
+              </a:spcAft>
+              <a:defRPr sz="1600">
+                <a:solidFill>
+                  <a:srgbClr val="000000"/>
+                </a:solidFill>
+              </a:defRPr>
+            </a:pPr>
+            <a:r>
+              <a:t>●  Neural Networks</a:t>
+            </a:r>
+          </a:p>
+          <a:p>
+            <a:pPr>
+              <a:spcAft>
+                <a:spcPts val="1080"/>
+              </a:spcAft>
+              <a:defRPr sz="1600">
+                <a:solidFill>
+                  <a:srgbClr val="000000"/>
+                </a:solidFill>
+              </a:defRPr>
+            </a:pPr>
+            <a:r>
+              <a:t>●  Natural Language Processing</a:t>
+            </a:r>
+          </a:p>
+          <a:p>
+            <a:pPr>
+              <a:spcAft>
+                <a:spcPts val="720"/>
+              </a:spcAft>
+              <a:defRPr sz="1600">
+                <a:solidFill>
+                  <a:srgbClr val="000000"/>
+                </a:solidFill>
+              </a:defRPr>
+            </a:pPr>
+            <a:r>
+              <a:t>●  Computer Vision</a:t>
+            </a:r>
+          </a:p>
+        </p:txBody>
+      </p:sp>
+      <p:sp>
+        <p:nvSpPr>
+          <p:cNvPr id="8" name="Oval 7"/>
+          <p:cNvSpPr/>
+          <p:nvPr/>
+        </p:nvSpPr>
+        <p:spPr>
+          <a:xfrm>
+            <a:off x="8229600" y="91440"/>
+            <a:ext cx="365760" cy="365760"/>
+          </a:xfrm>
+          <a:prstGeom prst="ellipse">
+            <a:avLst/>
+          </a:prstGeom>
+          <a:solidFill>
+            <a:srgbClr val="F1C40F"/>
+          </a:solidFill>
+          <a:ln>
+            <a:noFill/>
+          </a:ln>
+        </p:spPr>
+        <p:style>
+          <a:lnRef idx="1">
+            <a:schemeClr val="accent1"/>
+          </a:lnRef>
+          <a:fillRef idx="3">
+            <a:schemeClr val="accent1"/>
+          </a:fillRef>
+          <a:effectRef idx="2">
+            <a:schemeClr val="accent1"/>
+          </a:effectRef>
+          <a:fontRef idx="minor">
+            <a:schemeClr val="lt1"/>
+          </a:fontRef>
+        </p:style>
+        <p:txBody>
+          <a:bodyPr rtlCol="0" anchor="ctr"/>
+          <a:lstStyle/>
+          <a:p>
+            <a:pPr algn="ctr"/>
+          </a:p>
+        </p:txBody>
+      </p:sp>
+      <p:sp>
+        <p:nvSpPr>
+          <p:cNvPr id="9" name="Oval 8"/>
+          <p:cNvSpPr/>
+          <p:nvPr/>
+        </p:nvSpPr>
+        <p:spPr>
+          <a:xfrm>
+            <a:off x="91440" y="5943600"/>
+            <a:ext cx="274320" cy="274320"/>
+          </a:xfrm>
+          <a:prstGeom prst="ellipse">
+            <a:avLst/>
+          </a:prstGeom>
+          <a:solidFill>
+            <a:srgbClr val="3498DB"/>
+          </a:solidFill>
+          <a:ln>
+            <a:noFill/>
+          </a:ln>
+        </p:spPr>
+        <p:style>
+          <a:lnRef idx="1">
+            <a:schemeClr val="accent1"/>
+          </a:lnRef>
+          <a:fillRef idx="3">
+            <a:schemeClr val="accent1"/>
+          </a:fillRef>
+          <a:effectRef idx="2">
+            <a:schemeClr val="accent1"/>
+          </a:effectRef>
+          <a:fontRef idx="minor">
+            <a:schemeClr val="lt1"/>
+          </a:fontRef>
+        </p:style>
+        <p:txBody>
+          <a:bodyPr rtlCol="0" anchor="ctr"/>
+          <a:lstStyle/>
+          <a:p>
+            <a:pPr algn="ctr"/>
+          </a:p>
+        </p:txBody>
+      </p:sp>
     </p:spTree>
   </p:cSld>
   <p:clrMapOvr>
@@ -3759,7 +3942,7 @@
     <p:bg>
       <p:bgPr>
         <a:solidFill>
-          <a:srgbClr val="36454F"/>
+          <a:srgbClr val="3498DB"/>
         </a:solidFill>
         <a:effectLst/>
       </p:bgPr>
@@ -3773,14 +3956,60 @@
       <p:grpSpPr/>
       <p:sp>
         <p:nvSpPr>
-          <p:cNvPr id="2" name="TextBox 1"/>
+          <p:cNvPr id="2" name="Rounded Rectangle 1"/>
+          <p:cNvSpPr/>
+          <p:nvPr/>
+        </p:nvSpPr>
+        <p:spPr>
+          <a:xfrm>
+            <a:off x="4754880" y="1371600"/>
+            <a:ext cx="3931920" cy="4114800"/>
+          </a:xfrm>
+          <a:prstGeom prst="roundRect">
+            <a:avLst/>
+          </a:prstGeom>
+          <a:solidFill>
+            <a:srgbClr val="FFFFFF"/>
+          </a:solidFill>
+          <a:ln w="12700">
+            <a:solidFill>
+              <a:srgbClr val="F1C40F"/>
+            </a:solidFill>
+            <a:prstDash val="dash"/>
+          </a:ln>
+        </p:spPr>
+        <p:style>
+          <a:lnRef idx="1">
+            <a:schemeClr val="accent1"/>
+          </a:lnRef>
+          <a:fillRef idx="3">
+            <a:schemeClr val="accent1"/>
+          </a:fillRef>
+          <a:effectRef idx="2">
+            <a:schemeClr val="accent1"/>
+          </a:effectRef>
+          <a:fontRef idx="minor">
+            <a:schemeClr val="lt1"/>
+          </a:fontRef>
+        </p:style>
+        <p:txBody>
+          <a:bodyPr rtlCol="0" anchor="ctr"/>
+          <a:lstStyle/>
+          <a:p>
+            <a:pPr algn="ctr"/>
+          </a:p>
+        </p:txBody>
+      </p:sp>
+      <p:sp>
+        <p:nvSpPr>
+          <p:cNvPr id="3" name="TextBox 2"/>
           <p:cNvSpPr txBox="1"/>
           <p:nvPr/>
         </p:nvSpPr>
         <p:spPr>
           <a:xfrm>
-            <a:off x="457200" y="457200"/>
-            <a:ext cx="8229600" cy="914400"/>
+            <a:off x="457200" y="274320"/>
+            <a:ext cx="8229600" cy="731520"/>
           </a:xfrm>
           <a:prstGeom prst="rect">
             <a:avLst/>
@@ -3793,29 +4022,141 @@
           </a:bodyPr>
           <a:lstStyle/>
           <a:p>
-            <a:pPr>
-              <a:defRPr sz="3200" b="1">
-                <a:solidFill>
-                  <a:srgbClr val="FFFFFF"/>
+            <a:pPr algn="ctr">
+              <a:defRPr sz="3600" b="1">
+                <a:solidFill>
+                  <a:srgbClr val="000000"/>
                 </a:solidFill>
               </a:defRPr>
             </a:pPr>
             <a:r>
-              <a:t>Applications</a:t>
-            </a:r>
-          </a:p>
-        </p:txBody>
-      </p:sp>
-      <p:sp>
-        <p:nvSpPr>
-          <p:cNvPr id="3" name="TextBox 2"/>
+              <a:t>AI Applications</a:t>
+            </a:r>
+          </a:p>
+        </p:txBody>
+      </p:sp>
+      <p:sp>
+        <p:nvSpPr>
+          <p:cNvPr id="4" name="Rectangle 3"/>
+          <p:cNvSpPr/>
+          <p:nvPr/>
+        </p:nvSpPr>
+        <p:spPr>
+          <a:xfrm>
+            <a:off x="914400" y="1005840"/>
+            <a:ext cx="7315200" cy="18288"/>
+          </a:xfrm>
+          <a:prstGeom prst="rect">
+            <a:avLst/>
+          </a:prstGeom>
+          <a:solidFill>
+            <a:srgbClr val="F1C40F"/>
+          </a:solidFill>
+          <a:ln>
+            <a:noFill/>
+          </a:ln>
+        </p:spPr>
+        <p:style>
+          <a:lnRef idx="1">
+            <a:schemeClr val="accent1"/>
+          </a:lnRef>
+          <a:fillRef idx="3">
+            <a:schemeClr val="accent1"/>
+          </a:fillRef>
+          <a:effectRef idx="2">
+            <a:schemeClr val="accent1"/>
+          </a:effectRef>
+          <a:fontRef idx="minor">
+            <a:schemeClr val="lt1"/>
+          </a:fontRef>
+        </p:style>
+        <p:txBody>
+          <a:bodyPr rtlCol="0" anchor="ctr"/>
+          <a:lstStyle/>
+          <a:p>
+            <a:pPr algn="ctr"/>
+          </a:p>
+        </p:txBody>
+      </p:sp>
+      <p:sp>
+        <p:nvSpPr>
+          <p:cNvPr id="5" name="Rounded Rectangle 4"/>
+          <p:cNvSpPr/>
+          <p:nvPr/>
+        </p:nvSpPr>
+        <p:spPr>
+          <a:xfrm>
+            <a:off x="731520" y="1371600"/>
+            <a:ext cx="3657600" cy="4114800"/>
+          </a:xfrm>
+          <a:prstGeom prst="roundRect">
+            <a:avLst/>
+          </a:prstGeom>
+          <a:solidFill>
+            <a:srgbClr val="FFFFFF"/>
+          </a:solidFill>
+          <a:ln w="25400">
+            <a:solidFill>
+              <a:srgbClr val="F1C40F"/>
+            </a:solidFill>
+          </a:ln>
+        </p:spPr>
+        <p:style>
+          <a:lnRef idx="1">
+            <a:schemeClr val="accent1"/>
+          </a:lnRef>
+          <a:fillRef idx="3">
+            <a:schemeClr val="accent1"/>
+          </a:fillRef>
+          <a:effectRef idx="2">
+            <a:schemeClr val="accent1"/>
+          </a:effectRef>
+          <a:fontRef idx="minor">
+            <a:schemeClr val="lt1"/>
+          </a:fontRef>
+        </p:style>
+        <p:txBody>
+          <a:bodyPr rtlCol="0" anchor="ctr"/>
+          <a:lstStyle/>
+          <a:p>
+            <a:pPr algn="ctr"/>
+          </a:p>
+        </p:txBody>
+      </p:sp>
+      <p:pic>
+        <p:nvPicPr>
+          <p:cNvPr id="6" name="Picture 5" descr="Artificial Intelligence Revolution_ViC0envGdTU.jpg"/>
+          <p:cNvPicPr>
+            <a:picLocks noChangeAspect="1"/>
+          </p:cNvPicPr>
+          <p:nvPr/>
+        </p:nvPicPr>
+        <p:blipFill>
+          <a:blip r:embed="rId2"/>
+          <a:stretch>
+            <a:fillRect/>
+          </a:stretch>
+        </p:blipFill>
+        <p:spPr>
+          <a:xfrm>
+            <a:off x="731520" y="2209800"/>
+            <a:ext cx="3657600" cy="2438400"/>
+          </a:xfrm>
+          <a:prstGeom prst="rect">
+            <a:avLst/>
+          </a:prstGeom>
+        </p:spPr>
+      </p:pic>
+      <p:sp>
+        <p:nvSpPr>
+          <p:cNvPr id="7" name="TextBox 6"/>
           <p:cNvSpPr txBox="1"/>
           <p:nvPr/>
         </p:nvSpPr>
         <p:spPr>
           <a:xfrm>
-            <a:off x="457200" y="1371600"/>
-            <a:ext cx="4114800" cy="5029200"/>
+            <a:off x="4937760" y="1828800"/>
+            <a:ext cx="3566160" cy="3749040"/>
           </a:xfrm>
           <a:prstGeom prst="rect">
             <a:avLst/>
@@ -3829,86 +4170,164 @@
           <a:lstStyle/>
           <a:p>
             <a:pPr>
-              <a:defRPr sz="1400">
-                <a:solidFill>
-                  <a:srgbClr val="FFFFFF"/>
+              <a:spcAft>
+                <a:spcPts val="1080"/>
+              </a:spcAft>
+              <a:defRPr sz="1600" b="1">
+                <a:solidFill>
+                  <a:srgbClr val="000000"/>
                 </a:solidFill>
               </a:defRPr>
             </a:pPr>
             <a:r>
-              <a:t>Image Synthesis</a:t>
+              <a:t>●  Virtual Assistants</a:t>
             </a:r>
           </a:p>
           <a:p>
             <a:pPr>
-              <a:defRPr sz="1400">
-                <a:solidFill>
-                  <a:srgbClr val="FFFFFF"/>
+              <a:spcAft>
+                <a:spcPts val="1080"/>
+              </a:spcAft>
+              <a:defRPr sz="1600">
+                <a:solidFill>
+                  <a:srgbClr val="000000"/>
                 </a:solidFill>
               </a:defRPr>
             </a:pPr>
             <a:r>
-              <a:t>Music Generation</a:t>
-            </a:r>
-          </a:p>
-        </p:txBody>
-      </p:sp>
-      <p:sp>
-        <p:nvSpPr>
-          <p:cNvPr id="4" name="TextBox 3"/>
-          <p:cNvSpPr txBox="1"/>
+              <a:t>●  Image Recognition</a:t>
+            </a:r>
+          </a:p>
+          <a:p>
+            <a:pPr>
+              <a:spcAft>
+                <a:spcPts val="1080"/>
+              </a:spcAft>
+              <a:defRPr sz="1600">
+                <a:solidFill>
+                  <a:srgbClr val="000000"/>
+                </a:solidFill>
+              </a:defRPr>
+            </a:pPr>
+            <a:r>
+              <a:t>●  Speech Recognition</a:t>
+            </a:r>
+          </a:p>
+          <a:p>
+            <a:pPr>
+              <a:spcAft>
+                <a:spcPts val="1080"/>
+              </a:spcAft>
+              <a:defRPr sz="1600">
+                <a:solidFill>
+                  <a:srgbClr val="000000"/>
+                </a:solidFill>
+              </a:defRPr>
+            </a:pPr>
+            <a:r>
+              <a:t>●  Predictive Maintenance</a:t>
+            </a:r>
+          </a:p>
+          <a:p>
+            <a:pPr>
+              <a:spcAft>
+                <a:spcPts val="720"/>
+              </a:spcAft>
+              <a:defRPr sz="1600">
+                <a:solidFill>
+                  <a:srgbClr val="000000"/>
+                </a:solidFill>
+              </a:defRPr>
+            </a:pPr>
+            <a:r>
+              <a:t>●  Chatbots</a:t>
+            </a:r>
+          </a:p>
+        </p:txBody>
+      </p:sp>
+      <p:sp>
+        <p:nvSpPr>
+          <p:cNvPr id="8" name="Oval 7"/>
+          <p:cNvSpPr/>
           <p:nvPr/>
         </p:nvSpPr>
         <p:spPr>
           <a:xfrm>
-            <a:off x="5029200" y="1371600"/>
-            <a:ext cx="4114800" cy="5029200"/>
-          </a:xfrm>
-          <a:prstGeom prst="rect">
+            <a:off x="8229600" y="91440"/>
+            <a:ext cx="365760" cy="365760"/>
+          </a:xfrm>
+          <a:prstGeom prst="ellipse">
             <a:avLst/>
           </a:prstGeom>
-          <a:noFill/>
-        </p:spPr>
-        <p:txBody>
-          <a:bodyPr wrap="square">
-            <a:spAutoFit/>
-          </a:bodyPr>
-          <a:lstStyle/>
-          <a:p>
-            <a:pPr>
-              <a:defRPr sz="1400">
-                <a:solidFill>
-                  <a:srgbClr val="FFFFFF"/>
-                </a:solidFill>
-              </a:defRPr>
-            </a:pPr>
-            <a:r>
-              <a:t>Text Summarization</a:t>
-            </a:r>
-          </a:p>
-          <a:p>
-            <a:pPr>
-              <a:defRPr sz="1400">
-                <a:solidFill>
-                  <a:srgbClr val="FFFFFF"/>
-                </a:solidFill>
-              </a:defRPr>
-            </a:pPr>
-            <a:r>
-              <a:t>Content Creation</a:t>
-            </a:r>
-          </a:p>
-          <a:p>
-            <a:pPr>
-              <a:defRPr sz="1400">
-                <a:solidFill>
-                  <a:srgbClr val="FFFFFF"/>
-                </a:solidFill>
-              </a:defRPr>
-            </a:pPr>
-            <a:r>
-              <a:t>Data Generation</a:t>
-            </a:r>
+          <a:solidFill>
+            <a:srgbClr val="F1C40F"/>
+          </a:solidFill>
+          <a:ln>
+            <a:noFill/>
+          </a:ln>
+        </p:spPr>
+        <p:style>
+          <a:lnRef idx="1">
+            <a:schemeClr val="accent1"/>
+          </a:lnRef>
+          <a:fillRef idx="3">
+            <a:schemeClr val="accent1"/>
+          </a:fillRef>
+          <a:effectRef idx="2">
+            <a:schemeClr val="accent1"/>
+          </a:effectRef>
+          <a:fontRef idx="minor">
+            <a:schemeClr val="lt1"/>
+          </a:fontRef>
+        </p:style>
+        <p:txBody>
+          <a:bodyPr rtlCol="0" anchor="ctr"/>
+          <a:lstStyle/>
+          <a:p>
+            <a:pPr algn="ctr"/>
+          </a:p>
+        </p:txBody>
+      </p:sp>
+      <p:sp>
+        <p:nvSpPr>
+          <p:cNvPr id="9" name="Oval 8"/>
+          <p:cNvSpPr/>
+          <p:nvPr/>
+        </p:nvSpPr>
+        <p:spPr>
+          <a:xfrm>
+            <a:off x="91440" y="5943600"/>
+            <a:ext cx="274320" cy="274320"/>
+          </a:xfrm>
+          <a:prstGeom prst="ellipse">
+            <a:avLst/>
+          </a:prstGeom>
+          <a:solidFill>
+            <a:srgbClr val="3498DB"/>
+          </a:solidFill>
+          <a:ln>
+            <a:noFill/>
+          </a:ln>
+        </p:spPr>
+        <p:style>
+          <a:lnRef idx="1">
+            <a:schemeClr val="accent1"/>
+          </a:lnRef>
+          <a:fillRef idx="3">
+            <a:schemeClr val="accent1"/>
+          </a:fillRef>
+          <a:effectRef idx="2">
+            <a:schemeClr val="accent1"/>
+          </a:effectRef>
+          <a:fontRef idx="minor">
+            <a:schemeClr val="lt1"/>
+          </a:fontRef>
+        </p:style>
+        <p:txBody>
+          <a:bodyPr rtlCol="0" anchor="ctr"/>
+          <a:lstStyle/>
+          <a:p>
+            <a:pPr algn="ctr"/>
           </a:p>
         </p:txBody>
       </p:sp>
@@ -3926,7 +4345,7 @@
     <p:bg>
       <p:bgPr>
         <a:solidFill>
-          <a:srgbClr val="36454F"/>
+          <a:srgbClr val="3498DB"/>
         </a:solidFill>
         <a:effectLst/>
       </p:bgPr>
@@ -3940,14 +4359,60 @@
       <p:grpSpPr/>
       <p:sp>
         <p:nvSpPr>
-          <p:cNvPr id="2" name="TextBox 1"/>
+          <p:cNvPr id="2" name="Rounded Rectangle 1"/>
+          <p:cNvSpPr/>
+          <p:nvPr/>
+        </p:nvSpPr>
+        <p:spPr>
+          <a:xfrm>
+            <a:off x="4754880" y="1371600"/>
+            <a:ext cx="3931920" cy="4114800"/>
+          </a:xfrm>
+          <a:prstGeom prst="roundRect">
+            <a:avLst/>
+          </a:prstGeom>
+          <a:solidFill>
+            <a:srgbClr val="FFFFFF"/>
+          </a:solidFill>
+          <a:ln w="12700">
+            <a:solidFill>
+              <a:srgbClr val="F1C40F"/>
+            </a:solidFill>
+            <a:prstDash val="dash"/>
+          </a:ln>
+        </p:spPr>
+        <p:style>
+          <a:lnRef idx="1">
+            <a:schemeClr val="accent1"/>
+          </a:lnRef>
+          <a:fillRef idx="3">
+            <a:schemeClr val="accent1"/>
+          </a:fillRef>
+          <a:effectRef idx="2">
+            <a:schemeClr val="accent1"/>
+          </a:effectRef>
+          <a:fontRef idx="minor">
+            <a:schemeClr val="lt1"/>
+          </a:fontRef>
+        </p:style>
+        <p:txBody>
+          <a:bodyPr rtlCol="0" anchor="ctr"/>
+          <a:lstStyle/>
+          <a:p>
+            <a:pPr algn="ctr"/>
+          </a:p>
+        </p:txBody>
+      </p:sp>
+      <p:sp>
+        <p:nvSpPr>
+          <p:cNvPr id="3" name="TextBox 2"/>
           <p:cNvSpPr txBox="1"/>
           <p:nvPr/>
         </p:nvSpPr>
         <p:spPr>
           <a:xfrm>
-            <a:off x="457200" y="457200"/>
-            <a:ext cx="8229600" cy="914400"/>
+            <a:off x="457200" y="274320"/>
+            <a:ext cx="8229600" cy="731520"/>
           </a:xfrm>
           <a:prstGeom prst="rect">
             <a:avLst/>
@@ -3960,22 +4425,110 @@
           </a:bodyPr>
           <a:lstStyle/>
           <a:p>
-            <a:pPr>
-              <a:defRPr sz="3200" b="1">
-                <a:solidFill>
-                  <a:srgbClr val="FFFFFF"/>
+            <a:pPr algn="ctr">
+              <a:defRPr sz="3600" b="1">
+                <a:solidFill>
+                  <a:srgbClr val="000000"/>
                 </a:solidFill>
               </a:defRPr>
             </a:pPr>
             <a:r>
-              <a:t>Advantages</a:t>
-            </a:r>
+              <a:t>Benefits of AI</a:t>
+            </a:r>
+          </a:p>
+        </p:txBody>
+      </p:sp>
+      <p:sp>
+        <p:nvSpPr>
+          <p:cNvPr id="4" name="Rectangle 3"/>
+          <p:cNvSpPr/>
+          <p:nvPr/>
+        </p:nvSpPr>
+        <p:spPr>
+          <a:xfrm>
+            <a:off x="914400" y="1005840"/>
+            <a:ext cx="7315200" cy="18288"/>
+          </a:xfrm>
+          <a:prstGeom prst="rect">
+            <a:avLst/>
+          </a:prstGeom>
+          <a:solidFill>
+            <a:srgbClr val="F1C40F"/>
+          </a:solidFill>
+          <a:ln>
+            <a:noFill/>
+          </a:ln>
+        </p:spPr>
+        <p:style>
+          <a:lnRef idx="1">
+            <a:schemeClr val="accent1"/>
+          </a:lnRef>
+          <a:fillRef idx="3">
+            <a:schemeClr val="accent1"/>
+          </a:fillRef>
+          <a:effectRef idx="2">
+            <a:schemeClr val="accent1"/>
+          </a:effectRef>
+          <a:fontRef idx="minor">
+            <a:schemeClr val="lt1"/>
+          </a:fontRef>
+        </p:style>
+        <p:txBody>
+          <a:bodyPr rtlCol="0" anchor="ctr"/>
+          <a:lstStyle/>
+          <a:p>
+            <a:pPr algn="ctr"/>
+          </a:p>
+        </p:txBody>
+      </p:sp>
+      <p:sp>
+        <p:nvSpPr>
+          <p:cNvPr id="5" name="Rounded Rectangle 4"/>
+          <p:cNvSpPr/>
+          <p:nvPr/>
+        </p:nvSpPr>
+        <p:spPr>
+          <a:xfrm>
+            <a:off x="731520" y="1371600"/>
+            <a:ext cx="3657600" cy="4114800"/>
+          </a:xfrm>
+          <a:prstGeom prst="roundRect">
+            <a:avLst/>
+          </a:prstGeom>
+          <a:solidFill>
+            <a:srgbClr val="FFFFFF"/>
+          </a:solidFill>
+          <a:ln w="25400">
+            <a:solidFill>
+              <a:srgbClr val="F1C40F"/>
+            </a:solidFill>
+          </a:ln>
+        </p:spPr>
+        <p:style>
+          <a:lnRef idx="1">
+            <a:schemeClr val="accent1"/>
+          </a:lnRef>
+          <a:fillRef idx="3">
+            <a:schemeClr val="accent1"/>
+          </a:fillRef>
+          <a:effectRef idx="2">
+            <a:schemeClr val="accent1"/>
+          </a:effectRef>
+          <a:fontRef idx="minor">
+            <a:schemeClr val="lt1"/>
+          </a:fontRef>
+        </p:style>
+        <p:txBody>
+          <a:bodyPr rtlCol="0" anchor="ctr"/>
+          <a:lstStyle/>
+          <a:p>
+            <a:pPr algn="ctr"/>
           </a:p>
         </p:txBody>
       </p:sp>
       <p:pic>
         <p:nvPicPr>
-          <p:cNvPr id="3" name="Picture 2" descr="Advantages_m-HZ2aex1so.jpg"/>
+          <p:cNvPr id="6" name="Picture 5" descr="Artificial Intelligence Revolution_ViC0envGdTU.jpg"/>
           <p:cNvPicPr>
             <a:picLocks noChangeAspect="1"/>
           </p:cNvPicPr>
@@ -3989,8 +4542,8 @@
         </p:blipFill>
         <p:spPr>
           <a:xfrm>
-            <a:off x="457200" y="1371600"/>
-            <a:ext cx="4114800" cy="5029200"/>
+            <a:off x="731520" y="2209800"/>
+            <a:ext cx="3657600" cy="2438400"/>
           </a:xfrm>
           <a:prstGeom prst="rect">
             <a:avLst/>
@@ -3999,14 +4552,14 @@
       </p:pic>
       <p:sp>
         <p:nvSpPr>
-          <p:cNvPr id="4" name="TextBox 3"/>
+          <p:cNvPr id="7" name="TextBox 6"/>
           <p:cNvSpPr txBox="1"/>
           <p:nvPr/>
         </p:nvSpPr>
         <p:spPr>
           <a:xfrm>
-            <a:off x="5029200" y="1371600"/>
-            <a:ext cx="4114800" cy="5029200"/>
+            <a:off x="4937760" y="1828800"/>
+            <a:ext cx="3566160" cy="3749040"/>
           </a:xfrm>
           <a:prstGeom prst="rect">
             <a:avLst/>
@@ -4020,63 +4573,164 @@
           <a:lstStyle/>
           <a:p>
             <a:pPr>
-              <a:defRPr sz="1400">
-                <a:solidFill>
-                  <a:srgbClr val="FFFFFF"/>
+              <a:spcAft>
+                <a:spcPts val="1080"/>
+              </a:spcAft>
+              <a:defRPr sz="1600" b="1">
+                <a:solidFill>
+                  <a:srgbClr val="000000"/>
                 </a:solidFill>
               </a:defRPr>
             </a:pPr>
             <a:r>
-              <a:t>Increased Efficiency</a:t>
+              <a:t>●  Increased Efficiency</a:t>
             </a:r>
           </a:p>
           <a:p>
             <a:pPr>
-              <a:defRPr sz="1400">
-                <a:solidFill>
-                  <a:srgbClr val="FFFFFF"/>
+              <a:spcAft>
+                <a:spcPts val="1080"/>
+              </a:spcAft>
+              <a:defRPr sz="1600">
+                <a:solidFill>
+                  <a:srgbClr val="000000"/>
                 </a:solidFill>
               </a:defRPr>
             </a:pPr>
             <a:r>
-              <a:t>Improved Accuracy</a:t>
+              <a:t>●  Improved Accuracy</a:t>
             </a:r>
           </a:p>
           <a:p>
             <a:pPr>
-              <a:defRPr sz="1400">
-                <a:solidFill>
-                  <a:srgbClr val="FFFFFF"/>
+              <a:spcAft>
+                <a:spcPts val="1080"/>
+              </a:spcAft>
+              <a:defRPr sz="1600">
+                <a:solidFill>
+                  <a:srgbClr val="000000"/>
                 </a:solidFill>
               </a:defRPr>
             </a:pPr>
             <a:r>
-              <a:t>Enhanced Creativity</a:t>
+              <a:t>●  Enhanced Decision Making</a:t>
             </a:r>
           </a:p>
           <a:p>
             <a:pPr>
-              <a:defRPr sz="1400">
-                <a:solidFill>
-                  <a:srgbClr val="FFFFFF"/>
+              <a:spcAft>
+                <a:spcPts val="1080"/>
+              </a:spcAft>
+              <a:defRPr sz="1600">
+                <a:solidFill>
+                  <a:srgbClr val="000000"/>
                 </a:solidFill>
               </a:defRPr>
             </a:pPr>
             <a:r>
-              <a:t>Reduced Costs</a:t>
+              <a:t>●  Personalized Experiences</a:t>
             </a:r>
           </a:p>
           <a:p>
             <a:pPr>
-              <a:defRPr sz="1400">
-                <a:solidFill>
-                  <a:srgbClr val="FFFFFF"/>
+              <a:spcAft>
+                <a:spcPts val="720"/>
+              </a:spcAft>
+              <a:defRPr sz="1600">
+                <a:solidFill>
+                  <a:srgbClr val="000000"/>
                 </a:solidFill>
               </a:defRPr>
             </a:pPr>
             <a:r>
-              <a:t>Faster Development</a:t>
-            </a:r>
+              <a:t>●  Automation</a:t>
+            </a:r>
+          </a:p>
+        </p:txBody>
+      </p:sp>
+      <p:sp>
+        <p:nvSpPr>
+          <p:cNvPr id="8" name="Oval 7"/>
+          <p:cNvSpPr/>
+          <p:nvPr/>
+        </p:nvSpPr>
+        <p:spPr>
+          <a:xfrm>
+            <a:off x="8229600" y="91440"/>
+            <a:ext cx="365760" cy="365760"/>
+          </a:xfrm>
+          <a:prstGeom prst="ellipse">
+            <a:avLst/>
+          </a:prstGeom>
+          <a:solidFill>
+            <a:srgbClr val="F1C40F"/>
+          </a:solidFill>
+          <a:ln>
+            <a:noFill/>
+          </a:ln>
+        </p:spPr>
+        <p:style>
+          <a:lnRef idx="1">
+            <a:schemeClr val="accent1"/>
+          </a:lnRef>
+          <a:fillRef idx="3">
+            <a:schemeClr val="accent1"/>
+          </a:fillRef>
+          <a:effectRef idx="2">
+            <a:schemeClr val="accent1"/>
+          </a:effectRef>
+          <a:fontRef idx="minor">
+            <a:schemeClr val="lt1"/>
+          </a:fontRef>
+        </p:style>
+        <p:txBody>
+          <a:bodyPr rtlCol="0" anchor="ctr"/>
+          <a:lstStyle/>
+          <a:p>
+            <a:pPr algn="ctr"/>
+          </a:p>
+        </p:txBody>
+      </p:sp>
+      <p:sp>
+        <p:nvSpPr>
+          <p:cNvPr id="9" name="Oval 8"/>
+          <p:cNvSpPr/>
+          <p:nvPr/>
+        </p:nvSpPr>
+        <p:spPr>
+          <a:xfrm>
+            <a:off x="91440" y="5943600"/>
+            <a:ext cx="274320" cy="274320"/>
+          </a:xfrm>
+          <a:prstGeom prst="ellipse">
+            <a:avLst/>
+          </a:prstGeom>
+          <a:solidFill>
+            <a:srgbClr val="3498DB"/>
+          </a:solidFill>
+          <a:ln>
+            <a:noFill/>
+          </a:ln>
+        </p:spPr>
+        <p:style>
+          <a:lnRef idx="1">
+            <a:schemeClr val="accent1"/>
+          </a:lnRef>
+          <a:fillRef idx="3">
+            <a:schemeClr val="accent1"/>
+          </a:fillRef>
+          <a:effectRef idx="2">
+            <a:schemeClr val="accent1"/>
+          </a:effectRef>
+          <a:fontRef idx="minor">
+            <a:schemeClr val="lt1"/>
+          </a:fontRef>
+        </p:style>
+        <p:txBody>
+          <a:bodyPr rtlCol="0" anchor="ctr"/>
+          <a:lstStyle/>
+          <a:p>
+            <a:pPr algn="ctr"/>
           </a:p>
         </p:txBody>
       </p:sp>
@@ -4094,7 +4748,7 @@
     <p:bg>
       <p:bgPr>
         <a:solidFill>
-          <a:srgbClr val="36454F"/>
+          <a:srgbClr val="3498DB"/>
         </a:solidFill>
         <a:effectLst/>
       </p:bgPr>
@@ -4124,12 +4778,12 @@
             <a:pPr>
               <a:defRPr>
                 <a:solidFill>
-                  <a:srgbClr val="FFFFFF"/>
+                  <a:srgbClr val="000000"/>
                 </a:solidFill>
               </a:defRPr>
             </a:pPr>
             <a:r>
-              <a:t>Challenges</a:t>
+              <a:t>Challenges of AI</a:t>
             </a:r>
           </a:p>
         </p:txBody>
@@ -4154,7 +4808,7 @@
             <a:pPr>
               <a:defRPr>
                 <a:solidFill>
-                  <a:srgbClr val="FFFFFF"/>
+                  <a:srgbClr val="000000"/>
                 </a:solidFill>
               </a:defRPr>
             </a:pPr>
@@ -4166,48 +4820,48 @@
             <a:pPr>
               <a:defRPr>
                 <a:solidFill>
-                  <a:srgbClr val="FFFFFF"/>
+                  <a:srgbClr val="000000"/>
                 </a:solidFill>
               </a:defRPr>
             </a:pPr>
             <a:r>
-              <a:t>Lack of Transparency</a:t>
+              <a:t>Job Displacement</a:t>
             </a:r>
           </a:p>
           <a:p>
             <a:pPr>
               <a:defRPr>
                 <a:solidFill>
-                  <a:srgbClr val="FFFFFF"/>
+                  <a:srgbClr val="000000"/>
                 </a:solidFill>
               </a:defRPr>
             </a:pPr>
             <a:r>
-              <a:t>Difficulty in Evaluation</a:t>
+              <a:t>Security Risks</a:t>
             </a:r>
           </a:p>
           <a:p>
             <a:pPr>
               <a:defRPr>
                 <a:solidFill>
-                  <a:srgbClr val="FFFFFF"/>
+                  <a:srgbClr val="000000"/>
                 </a:solidFill>
               </a:defRPr>
             </a:pPr>
             <a:r>
-              <a:t>High Computational Requirements</a:t>
+              <a:t>Explainability</a:t>
             </a:r>
           </a:p>
           <a:p>
             <a:pPr>
               <a:defRPr>
                 <a:solidFill>
-                  <a:srgbClr val="FFFFFF"/>
+                  <a:srgbClr val="000000"/>
                 </a:solidFill>
               </a:defRPr>
             </a:pPr>
             <a:r>
-              <a:t>Limited Control</a:t>
+              <a:t>Transparency</a:t>
             </a:r>
           </a:p>
         </p:txBody>
@@ -4226,7 +4880,7 @@
     <p:bg>
       <p:bgPr>
         <a:solidFill>
-          <a:srgbClr val="36454F"/>
+          <a:srgbClr val="3498DB"/>
         </a:solidFill>
         <a:effectLst/>
       </p:bgPr>
@@ -4246,8 +4900,8 @@
         </p:nvSpPr>
         <p:spPr>
           <a:xfrm>
-            <a:off x="457200" y="457200"/>
-            <a:ext cx="8229600" cy="914400"/>
+            <a:off x="457200" y="274320"/>
+            <a:ext cx="8229600" cy="731520"/>
           </a:xfrm>
           <a:prstGeom prst="rect">
             <a:avLst/>
@@ -4260,29 +4914,118 @@
           </a:bodyPr>
           <a:lstStyle/>
           <a:p>
-            <a:pPr>
-              <a:defRPr sz="3200" b="1">
-                <a:solidFill>
-                  <a:srgbClr val="FFFFFF"/>
+            <a:pPr algn="ctr">
+              <a:defRPr sz="3600" b="1">
+                <a:solidFill>
+                  <a:srgbClr val="000000"/>
                 </a:solidFill>
               </a:defRPr>
             </a:pPr>
             <a:r>
-              <a:t>Real-World Examples</a:t>
-            </a:r>
-          </a:p>
-        </p:txBody>
-      </p:sp>
-      <p:sp>
-        <p:nvSpPr>
-          <p:cNvPr id="3" name="TextBox 2"/>
+              <a:t>AI in Industry</a:t>
+            </a:r>
+          </a:p>
+        </p:txBody>
+      </p:sp>
+      <p:sp>
+        <p:nvSpPr>
+          <p:cNvPr id="3" name="Rectangle 2"/>
+          <p:cNvSpPr/>
+          <p:nvPr/>
+        </p:nvSpPr>
+        <p:spPr>
+          <a:xfrm>
+            <a:off x="914400" y="1005840"/>
+            <a:ext cx="7315200" cy="18288"/>
+          </a:xfrm>
+          <a:prstGeom prst="rect">
+            <a:avLst/>
+          </a:prstGeom>
+          <a:solidFill>
+            <a:srgbClr val="F1C40F"/>
+          </a:solidFill>
+          <a:ln>
+            <a:noFill/>
+          </a:ln>
+        </p:spPr>
+        <p:style>
+          <a:lnRef idx="1">
+            <a:schemeClr val="accent1"/>
+          </a:lnRef>
+          <a:fillRef idx="3">
+            <a:schemeClr val="accent1"/>
+          </a:fillRef>
+          <a:effectRef idx="2">
+            <a:schemeClr val="accent1"/>
+          </a:effectRef>
+          <a:fontRef idx="minor">
+            <a:schemeClr val="lt1"/>
+          </a:fontRef>
+        </p:style>
+        <p:txBody>
+          <a:bodyPr rtlCol="0" anchor="ctr"/>
+          <a:lstStyle/>
+          <a:p>
+            <a:pPr algn="ctr"/>
+          </a:p>
+        </p:txBody>
+      </p:sp>
+      <p:sp>
+        <p:nvSpPr>
+          <p:cNvPr id="4" name="Rounded Rectangle 3"/>
+          <p:cNvSpPr/>
+          <p:nvPr/>
+        </p:nvSpPr>
+        <p:spPr>
+          <a:xfrm>
+            <a:off x="457200" y="1371600"/>
+            <a:ext cx="4114800" cy="4114800"/>
+          </a:xfrm>
+          <a:prstGeom prst="roundRect">
+            <a:avLst/>
+          </a:prstGeom>
+          <a:solidFill>
+            <a:srgbClr val="FFFFFF"/>
+          </a:solidFill>
+          <a:ln w="12700">
+            <a:solidFill>
+              <a:srgbClr val="F1C40F"/>
+            </a:solidFill>
+            <a:prstDash val="dash"/>
+          </a:ln>
+        </p:spPr>
+        <p:style>
+          <a:lnRef idx="1">
+            <a:schemeClr val="accent1"/>
+          </a:lnRef>
+          <a:fillRef idx="3">
+            <a:schemeClr val="accent1"/>
+          </a:fillRef>
+          <a:effectRef idx="2">
+            <a:schemeClr val="accent1"/>
+          </a:effectRef>
+          <a:fontRef idx="minor">
+            <a:schemeClr val="lt1"/>
+          </a:fontRef>
+        </p:style>
+        <p:txBody>
+          <a:bodyPr rtlCol="0" anchor="ctr"/>
+          <a:lstStyle/>
+          <a:p>
+            <a:pPr algn="ctr"/>
+          </a:p>
+        </p:txBody>
+      </p:sp>
+      <p:sp>
+        <p:nvSpPr>
+          <p:cNvPr id="5" name="TextBox 4"/>
           <p:cNvSpPr txBox="1"/>
           <p:nvPr/>
         </p:nvSpPr>
         <p:spPr>
           <a:xfrm>
-            <a:off x="457200" y="1371600"/>
-            <a:ext cx="4114800" cy="5029200"/>
+            <a:off x="640080" y="1828800"/>
+            <a:ext cx="3749040" cy="3749040"/>
           </a:xfrm>
           <a:prstGeom prst="rect">
             <a:avLst/>
@@ -4296,86 +5039,233 @@
           <a:lstStyle/>
           <a:p>
             <a:pPr>
-              <a:defRPr sz="1400">
-                <a:solidFill>
-                  <a:srgbClr val="FFFFFF"/>
+              <a:spcAft>
+                <a:spcPts val="1080"/>
+              </a:spcAft>
+              <a:defRPr sz="1600" b="1">
+                <a:solidFill>
+                  <a:srgbClr val="000000"/>
                 </a:solidFill>
               </a:defRPr>
             </a:pPr>
             <a:r>
-              <a:t>Deepfake Videos</a:t>
+              <a:t>●  Healthcare</a:t>
             </a:r>
           </a:p>
           <a:p>
             <a:pPr>
-              <a:defRPr sz="1400">
-                <a:solidFill>
-                  <a:srgbClr val="FFFFFF"/>
+              <a:spcAft>
+                <a:spcPts val="1080"/>
+              </a:spcAft>
+              <a:defRPr sz="1600">
+                <a:solidFill>
+                  <a:srgbClr val="000000"/>
                 </a:solidFill>
               </a:defRPr>
             </a:pPr>
             <a:r>
-              <a:t>AI-Generated Art</a:t>
-            </a:r>
-          </a:p>
-        </p:txBody>
-      </p:sp>
-      <p:sp>
-        <p:nvSpPr>
-          <p:cNvPr id="4" name="TextBox 3"/>
-          <p:cNvSpPr txBox="1"/>
+              <a:t>●  Finance</a:t>
+            </a:r>
+          </a:p>
+          <a:p>
+            <a:pPr>
+              <a:spcAft>
+                <a:spcPts val="1080"/>
+              </a:spcAft>
+              <a:defRPr sz="1600">
+                <a:solidFill>
+                  <a:srgbClr val="000000"/>
+                </a:solidFill>
+              </a:defRPr>
+            </a:pPr>
+            <a:r>
+              <a:t>●  Transportation</a:t>
+            </a:r>
+          </a:p>
+          <a:p>
+            <a:pPr>
+              <a:spcAft>
+                <a:spcPts val="1080"/>
+              </a:spcAft>
+              <a:defRPr sz="1600">
+                <a:solidFill>
+                  <a:srgbClr val="000000"/>
+                </a:solidFill>
+              </a:defRPr>
+            </a:pPr>
+            <a:r>
+              <a:t>●  Education</a:t>
+            </a:r>
+          </a:p>
+          <a:p>
+            <a:pPr>
+              <a:spcAft>
+                <a:spcPts val="720"/>
+              </a:spcAft>
+              <a:defRPr sz="1600">
+                <a:solidFill>
+                  <a:srgbClr val="000000"/>
+                </a:solidFill>
+              </a:defRPr>
+            </a:pPr>
+            <a:r>
+              <a:t>●  Manufacturing</a:t>
+            </a:r>
+          </a:p>
+        </p:txBody>
+      </p:sp>
+      <p:sp>
+        <p:nvSpPr>
+          <p:cNvPr id="6" name="Rounded Rectangle 5"/>
+          <p:cNvSpPr/>
           <p:nvPr/>
         </p:nvSpPr>
         <p:spPr>
           <a:xfrm>
-            <a:off x="5029200" y="1371600"/>
-            <a:ext cx="4114800" cy="5029200"/>
+            <a:off x="4754880" y="1371600"/>
+            <a:ext cx="3931920" cy="4114800"/>
+          </a:xfrm>
+          <a:prstGeom prst="roundRect">
+            <a:avLst/>
+          </a:prstGeom>
+          <a:solidFill>
+            <a:srgbClr val="FFFFFF"/>
+          </a:solidFill>
+          <a:ln w="25400">
+            <a:solidFill>
+              <a:srgbClr val="F1C40F"/>
+            </a:solidFill>
+          </a:ln>
+        </p:spPr>
+        <p:style>
+          <a:lnRef idx="1">
+            <a:schemeClr val="accent1"/>
+          </a:lnRef>
+          <a:fillRef idx="3">
+            <a:schemeClr val="accent1"/>
+          </a:fillRef>
+          <a:effectRef idx="2">
+            <a:schemeClr val="accent1"/>
+          </a:effectRef>
+          <a:fontRef idx="minor">
+            <a:schemeClr val="lt1"/>
+          </a:fontRef>
+        </p:style>
+        <p:txBody>
+          <a:bodyPr rtlCol="0" anchor="ctr"/>
+          <a:lstStyle/>
+          <a:p>
+            <a:pPr algn="ctr"/>
+          </a:p>
+        </p:txBody>
+      </p:sp>
+      <p:pic>
+        <p:nvPicPr>
+          <p:cNvPr id="7" name="Picture 6" descr="Artificial Intelligence Revolution_ViC0envGdTU.jpg"/>
+          <p:cNvPicPr>
+            <a:picLocks noChangeAspect="1"/>
+          </p:cNvPicPr>
+          <p:nvPr/>
+        </p:nvPicPr>
+        <p:blipFill>
+          <a:blip r:embed="rId2"/>
+          <a:stretch>
+            <a:fillRect/>
+          </a:stretch>
+        </p:blipFill>
+        <p:spPr>
+          <a:xfrm>
+            <a:off x="4754880" y="2118360"/>
+            <a:ext cx="3931920" cy="2621280"/>
           </a:xfrm>
           <a:prstGeom prst="rect">
             <a:avLst/>
           </a:prstGeom>
-          <a:noFill/>
-        </p:spPr>
-        <p:txBody>
-          <a:bodyPr wrap="square">
-            <a:spAutoFit/>
-          </a:bodyPr>
-          <a:lstStyle/>
-          <a:p>
-            <a:pPr>
-              <a:defRPr sz="1400">
-                <a:solidFill>
-                  <a:srgbClr val="FFFFFF"/>
-                </a:solidFill>
-              </a:defRPr>
-            </a:pPr>
-            <a:r>
-              <a:t>Virtual Try-On</a:t>
-            </a:r>
-          </a:p>
-          <a:p>
-            <a:pPr>
-              <a:defRPr sz="1400">
-                <a:solidFill>
-                  <a:srgbClr val="FFFFFF"/>
-                </a:solidFill>
-              </a:defRPr>
-            </a:pPr>
-            <a:r>
-              <a:t>Personalized Recommendations</a:t>
-            </a:r>
-          </a:p>
-          <a:p>
-            <a:pPr>
-              <a:defRPr sz="1400">
-                <a:solidFill>
-                  <a:srgbClr val="FFFFFF"/>
-                </a:solidFill>
-              </a:defRPr>
-            </a:pPr>
-            <a:r>
-              <a:t>Automated Content Generation</a:t>
-            </a:r>
+        </p:spPr>
+      </p:pic>
+      <p:sp>
+        <p:nvSpPr>
+          <p:cNvPr id="8" name="Oval 7"/>
+          <p:cNvSpPr/>
+          <p:nvPr/>
+        </p:nvSpPr>
+        <p:spPr>
+          <a:xfrm>
+            <a:off x="8229600" y="91440"/>
+            <a:ext cx="365760" cy="365760"/>
+          </a:xfrm>
+          <a:prstGeom prst="ellipse">
+            <a:avLst/>
+          </a:prstGeom>
+          <a:solidFill>
+            <a:srgbClr val="F1C40F"/>
+          </a:solidFill>
+          <a:ln>
+            <a:noFill/>
+          </a:ln>
+        </p:spPr>
+        <p:style>
+          <a:lnRef idx="1">
+            <a:schemeClr val="accent1"/>
+          </a:lnRef>
+          <a:fillRef idx="3">
+            <a:schemeClr val="accent1"/>
+          </a:fillRef>
+          <a:effectRef idx="2">
+            <a:schemeClr val="accent1"/>
+          </a:effectRef>
+          <a:fontRef idx="minor">
+            <a:schemeClr val="lt1"/>
+          </a:fontRef>
+        </p:style>
+        <p:txBody>
+          <a:bodyPr rtlCol="0" anchor="ctr"/>
+          <a:lstStyle/>
+          <a:p>
+            <a:pPr algn="ctr"/>
+          </a:p>
+        </p:txBody>
+      </p:sp>
+      <p:sp>
+        <p:nvSpPr>
+          <p:cNvPr id="9" name="Oval 8"/>
+          <p:cNvSpPr/>
+          <p:nvPr/>
+        </p:nvSpPr>
+        <p:spPr>
+          <a:xfrm>
+            <a:off x="91440" y="5943600"/>
+            <a:ext cx="274320" cy="274320"/>
+          </a:xfrm>
+          <a:prstGeom prst="ellipse">
+            <a:avLst/>
+          </a:prstGeom>
+          <a:solidFill>
+            <a:srgbClr val="3498DB"/>
+          </a:solidFill>
+          <a:ln>
+            <a:noFill/>
+          </a:ln>
+        </p:spPr>
+        <p:style>
+          <a:lnRef idx="1">
+            <a:schemeClr val="accent1"/>
+          </a:lnRef>
+          <a:fillRef idx="3">
+            <a:schemeClr val="accent1"/>
+          </a:fillRef>
+          <a:effectRef idx="2">
+            <a:schemeClr val="accent1"/>
+          </a:effectRef>
+          <a:fontRef idx="minor">
+            <a:schemeClr val="lt1"/>
+          </a:fontRef>
+        </p:style>
+        <p:txBody>
+          <a:bodyPr rtlCol="0" anchor="ctr"/>
+          <a:lstStyle/>
+          <a:p>
+            <a:pPr algn="ctr"/>
           </a:p>
         </p:txBody>
       </p:sp>
@@ -4393,7 +5283,7 @@
     <p:bg>
       <p:bgPr>
         <a:solidFill>
-          <a:srgbClr val="36454F"/>
+          <a:srgbClr val="3498DB"/>
         </a:solidFill>
         <a:effectLst/>
       </p:bgPr>
@@ -4423,12 +5313,12 @@
             <a:pPr>
               <a:defRPr>
                 <a:solidFill>
-                  <a:srgbClr val="FFFFFF"/>
+                  <a:srgbClr val="000000"/>
                 </a:solidFill>
               </a:defRPr>
             </a:pPr>
             <a:r>
-              <a:t>Ethics and Responsibility</a:t>
+              <a:t>Future of AI</a:t>
             </a:r>
           </a:p>
         </p:txBody>
@@ -4453,60 +5343,48 @@
             <a:pPr>
               <a:defRPr>
                 <a:solidFill>
-                  <a:srgbClr val="FFFFFF"/>
+                  <a:srgbClr val="000000"/>
                 </a:solidFill>
               </a:defRPr>
             </a:pPr>
             <a:r>
-              <a:t>Data Privacy</a:t>
+              <a:t>Quantum Computing</a:t>
             </a:r>
           </a:p>
           <a:p>
             <a:pPr>
               <a:defRPr>
                 <a:solidFill>
-                  <a:srgbClr val="FFFFFF"/>
+                  <a:srgbClr val="000000"/>
                 </a:solidFill>
               </a:defRPr>
             </a:pPr>
             <a:r>
-              <a:t>Intellectual Property</a:t>
+              <a:t>Edge AI</a:t>
             </a:r>
           </a:p>
           <a:p>
             <a:pPr>
               <a:defRPr>
                 <a:solidFill>
-                  <a:srgbClr val="FFFFFF"/>
+                  <a:srgbClr val="000000"/>
                 </a:solidFill>
               </a:defRPr>
             </a:pPr>
             <a:r>
-              <a:t>Misinformation</a:t>
+              <a:t>Explainable AI</a:t>
             </a:r>
           </a:p>
           <a:p>
             <a:pPr>
               <a:defRPr>
                 <a:solidFill>
-                  <a:srgbClr val="FFFFFF"/>
+                  <a:srgbClr val="000000"/>
                 </a:solidFill>
               </a:defRPr>
             </a:pPr>
             <a:r>
-              <a:t>Social Impact</a:t>
-            </a:r>
-          </a:p>
-          <a:p>
-            <a:pPr>
-              <a:defRPr>
-                <a:solidFill>
-                  <a:srgbClr val="FFFFFF"/>
-                </a:solidFill>
-              </a:defRPr>
-            </a:pPr>
-            <a:r>
-              <a:t>Human Oversight</a:t>
+              <a:t>Human-AI Collaboration</a:t>
             </a:r>
           </a:p>
         </p:txBody>
@@ -4525,7 +5403,7 @@
     <p:bg>
       <p:bgPr>
         <a:solidFill>
-          <a:srgbClr val="36454F"/>
+          <a:srgbClr val="3498DB"/>
         </a:solidFill>
         <a:effectLst/>
       </p:bgPr>
@@ -4559,15 +5437,15 @@
           </a:bodyPr>
           <a:lstStyle/>
           <a:p>
-            <a:pPr>
+            <a:pPr algn="ctr">
               <a:defRPr sz="3200" b="1">
                 <a:solidFill>
-                  <a:srgbClr val="FFFFFF"/>
+                  <a:srgbClr val="000000"/>
                 </a:solidFill>
               </a:defRPr>
             </a:pPr>
             <a:r>
-              <a:t>Future Directions</a:t>
+              <a:t>Conclusion</a:t>
             </a:r>
           </a:p>
         </p:txBody>
@@ -4580,8 +5458,8 @@
         </p:nvSpPr>
         <p:spPr>
           <a:xfrm>
-            <a:off x="457200" y="1371600"/>
-            <a:ext cx="4114800" cy="5029200"/>
+            <a:off x="914400" y="1828800"/>
+            <a:ext cx="7315200" cy="3657600"/>
           </a:xfrm>
           <a:prstGeom prst="rect">
             <a:avLst/>
@@ -4589,91 +5467,44 @@
           <a:noFill/>
         </p:spPr>
         <p:txBody>
-          <a:bodyPr wrap="square">
+          <a:bodyPr wrap="square" anchor="ctr">
             <a:spAutoFit/>
           </a:bodyPr>
           <a:lstStyle/>
           <a:p>
-            <a:pPr>
-              <a:defRPr sz="1400">
-                <a:solidFill>
-                  <a:srgbClr val="FFFFFF"/>
+            <a:pPr algn="ctr">
+              <a:defRPr sz="2000">
+                <a:solidFill>
+                  <a:srgbClr val="000000"/>
                 </a:solidFill>
               </a:defRPr>
             </a:pPr>
             <a:r>
-              <a:t>Multimodal Learning</a:t>
-            </a:r>
-          </a:p>
-          <a:p>
-            <a:pPr>
-              <a:defRPr sz="1400">
-                <a:solidFill>
-                  <a:srgbClr val="FFFFFF"/>
+              <a:t>AI has the potential to revolutionize various industries</a:t>
+            </a:r>
+          </a:p>
+          <a:p>
+            <a:pPr algn="ctr">
+              <a:defRPr sz="2000">
+                <a:solidFill>
+                  <a:srgbClr val="000000"/>
                 </a:solidFill>
               </a:defRPr>
             </a:pPr>
             <a:r>
-              <a:t>Transfer Learning</a:t>
-            </a:r>
-          </a:p>
-        </p:txBody>
-      </p:sp>
-      <p:sp>
-        <p:nvSpPr>
-          <p:cNvPr id="4" name="TextBox 3"/>
-          <p:cNvSpPr txBox="1"/>
-          <p:nvPr/>
-        </p:nvSpPr>
-        <p:spPr>
-          <a:xfrm>
-            <a:off x="5029200" y="1371600"/>
-            <a:ext cx="4114800" cy="5029200"/>
-          </a:xfrm>
-          <a:prstGeom prst="rect">
-            <a:avLst/>
-          </a:prstGeom>
-          <a:noFill/>
-        </p:spPr>
-        <p:txBody>
-          <a:bodyPr wrap="square">
-            <a:spAutoFit/>
-          </a:bodyPr>
-          <a:lstStyle/>
-          <a:p>
-            <a:pPr>
-              <a:defRPr sz="1400">
-                <a:solidFill>
-                  <a:srgbClr val="FFFFFF"/>
+              <a:t>Its applications are vast and diverse</a:t>
+            </a:r>
+          </a:p>
+          <a:p>
+            <a:pPr algn="ctr">
+              <a:defRPr sz="2000">
+                <a:solidFill>
+                  <a:srgbClr val="000000"/>
                 </a:solidFill>
               </a:defRPr>
             </a:pPr>
             <a:r>
-              <a:t>Explainability</a:t>
-            </a:r>
-          </a:p>
-          <a:p>
-            <a:pPr>
-              <a:defRPr sz="1400">
-                <a:solidFill>
-                  <a:srgbClr val="FFFFFF"/>
-                </a:solidFill>
-              </a:defRPr>
-            </a:pPr>
-            <a:r>
-              <a:t>Human-AI Collaboration</a:t>
-            </a:r>
-          </a:p>
-          <a:p>
-            <a:pPr>
-              <a:defRPr sz="1400">
-                <a:solidFill>
-                  <a:srgbClr val="FFFFFF"/>
-                </a:solidFill>
-              </a:defRPr>
-            </a:pPr>
-            <a:r>
-              <a:t>Edge AI</a:t>
+              <a:t>AI requires careful consideration and development</a:t>
             </a:r>
           </a:p>
         </p:txBody>

</xml_diff>